<commit_message>
Fix storage activity diagram
</commit_message>
<xml_diff>
--- a/docs/diagrams/storageActivityDiagram.pptx
+++ b/docs/diagrams/storageActivityDiagram.pptx
@@ -104,6 +104,11 @@
       </a:defRPr>
     </a:lvl9pPr>
   </p:defaultTextStyle>
+  <p:extLst>
+    <p:ext uri="{EFAFB233-063F-42B5-8137-9DF3F51BA10A}">
+      <p15:sldGuideLst xmlns:p15="http://schemas.microsoft.com/office/powerpoint/2012/main"/>
+    </p:ext>
+  </p:extLst>
 </p:presentation>
 </file>
 
@@ -262,7 +267,7 @@
           <a:p>
             <a:fld id="{8AF45D9D-646D-4FDA-B36E-D5CF94CCA984}" type="datetimeFigureOut">
               <a:rPr lang="en-US" smtClean="0"/>
-              <a:t>10/25/2023</a:t>
+              <a:t>11/13/2023</a:t>
             </a:fld>
             <a:endParaRPr lang="en-US"/>
           </a:p>
@@ -460,7 +465,7 @@
           <a:p>
             <a:fld id="{8AF45D9D-646D-4FDA-B36E-D5CF94CCA984}" type="datetimeFigureOut">
               <a:rPr lang="en-US" smtClean="0"/>
-              <a:t>10/25/2023</a:t>
+              <a:t>11/13/2023</a:t>
             </a:fld>
             <a:endParaRPr lang="en-US"/>
           </a:p>
@@ -668,7 +673,7 @@
           <a:p>
             <a:fld id="{8AF45D9D-646D-4FDA-B36E-D5CF94CCA984}" type="datetimeFigureOut">
               <a:rPr lang="en-US" smtClean="0"/>
-              <a:t>10/25/2023</a:t>
+              <a:t>11/13/2023</a:t>
             </a:fld>
             <a:endParaRPr lang="en-US"/>
           </a:p>
@@ -866,7 +871,7 @@
           <a:p>
             <a:fld id="{8AF45D9D-646D-4FDA-B36E-D5CF94CCA984}" type="datetimeFigureOut">
               <a:rPr lang="en-US" smtClean="0"/>
-              <a:t>10/25/2023</a:t>
+              <a:t>11/13/2023</a:t>
             </a:fld>
             <a:endParaRPr lang="en-US"/>
           </a:p>
@@ -1141,7 +1146,7 @@
           <a:p>
             <a:fld id="{8AF45D9D-646D-4FDA-B36E-D5CF94CCA984}" type="datetimeFigureOut">
               <a:rPr lang="en-US" smtClean="0"/>
-              <a:t>10/25/2023</a:t>
+              <a:t>11/13/2023</a:t>
             </a:fld>
             <a:endParaRPr lang="en-US"/>
           </a:p>
@@ -1406,7 +1411,7 @@
           <a:p>
             <a:fld id="{8AF45D9D-646D-4FDA-B36E-D5CF94CCA984}" type="datetimeFigureOut">
               <a:rPr lang="en-US" smtClean="0"/>
-              <a:t>10/25/2023</a:t>
+              <a:t>11/13/2023</a:t>
             </a:fld>
             <a:endParaRPr lang="en-US"/>
           </a:p>
@@ -1818,7 +1823,7 @@
           <a:p>
             <a:fld id="{8AF45D9D-646D-4FDA-B36E-D5CF94CCA984}" type="datetimeFigureOut">
               <a:rPr lang="en-US" smtClean="0"/>
-              <a:t>10/25/2023</a:t>
+              <a:t>11/13/2023</a:t>
             </a:fld>
             <a:endParaRPr lang="en-US"/>
           </a:p>
@@ -1959,7 +1964,7 @@
           <a:p>
             <a:fld id="{8AF45D9D-646D-4FDA-B36E-D5CF94CCA984}" type="datetimeFigureOut">
               <a:rPr lang="en-US" smtClean="0"/>
-              <a:t>10/25/2023</a:t>
+              <a:t>11/13/2023</a:t>
             </a:fld>
             <a:endParaRPr lang="en-US"/>
           </a:p>
@@ -2072,7 +2077,7 @@
           <a:p>
             <a:fld id="{8AF45D9D-646D-4FDA-B36E-D5CF94CCA984}" type="datetimeFigureOut">
               <a:rPr lang="en-US" smtClean="0"/>
-              <a:t>10/25/2023</a:t>
+              <a:t>11/13/2023</a:t>
             </a:fld>
             <a:endParaRPr lang="en-US"/>
           </a:p>
@@ -2383,7 +2388,7 @@
           <a:p>
             <a:fld id="{8AF45D9D-646D-4FDA-B36E-D5CF94CCA984}" type="datetimeFigureOut">
               <a:rPr lang="en-US" smtClean="0"/>
-              <a:t>10/25/2023</a:t>
+              <a:t>11/13/2023</a:t>
             </a:fld>
             <a:endParaRPr lang="en-US"/>
           </a:p>
@@ -2671,7 +2676,7 @@
           <a:p>
             <a:fld id="{8AF45D9D-646D-4FDA-B36E-D5CF94CCA984}" type="datetimeFigureOut">
               <a:rPr lang="en-US" smtClean="0"/>
-              <a:t>10/25/2023</a:t>
+              <a:t>11/13/2023</a:t>
             </a:fld>
             <a:endParaRPr lang="en-US"/>
           </a:p>
@@ -2912,7 +2917,7 @@
           <a:p>
             <a:fld id="{8AF45D9D-646D-4FDA-B36E-D5CF94CCA984}" type="datetimeFigureOut">
               <a:rPr lang="en-US" smtClean="0"/>
-              <a:t>10/25/2023</a:t>
+              <a:t>11/13/2023</a:t>
             </a:fld>
             <a:endParaRPr lang="en-US"/>
           </a:p>
@@ -3329,73 +3334,25 @@
           <a:chExt cx="0" cy="0"/>
         </a:xfrm>
       </p:grpSpPr>
-      <p:sp>
-        <p:nvSpPr>
-          <p:cNvPr id="4" name="Oval 3">
-            <a:extLst>
-              <a:ext uri="{FF2B5EF4-FFF2-40B4-BE49-F238E27FC236}">
-                <a16:creationId xmlns:a16="http://schemas.microsoft.com/office/drawing/2014/main" id="{FEC7E5B3-6D99-E28F-A664-9BB39E5F1A42}"/>
-              </a:ext>
-            </a:extLst>
-          </p:cNvPr>
-          <p:cNvSpPr/>
-          <p:nvPr/>
-        </p:nvSpPr>
-        <p:spPr>
-          <a:xfrm>
-            <a:off x="4708896" y="581077"/>
-            <a:ext cx="179109" cy="169683"/>
-          </a:xfrm>
-          <a:prstGeom prst="ellipse">
-            <a:avLst/>
-          </a:prstGeom>
-          <a:solidFill>
-            <a:schemeClr val="tx1"/>
-          </a:solidFill>
-        </p:spPr>
-        <p:style>
-          <a:lnRef idx="2">
-            <a:schemeClr val="accent1">
-              <a:shade val="15000"/>
-            </a:schemeClr>
-          </a:lnRef>
-          <a:fillRef idx="1">
-            <a:schemeClr val="accent1"/>
-          </a:fillRef>
-          <a:effectRef idx="0">
-            <a:schemeClr val="accent1"/>
-          </a:effectRef>
-          <a:fontRef idx="minor">
-            <a:schemeClr val="lt1"/>
-          </a:fontRef>
-        </p:style>
-        <p:txBody>
-          <a:bodyPr rtlCol="0" anchor="ctr"/>
-          <a:lstStyle/>
-          <a:p>
-            <a:pPr algn="ctr"/>
-            <a:endParaRPr lang="en-US"/>
-          </a:p>
-        </p:txBody>
-      </p:sp>
       <p:cxnSp>
         <p:nvCxnSpPr>
-          <p:cNvPr id="6" name="Straight Arrow Connector 5">
-            <a:extLst>
-              <a:ext uri="{FF2B5EF4-FFF2-40B4-BE49-F238E27FC236}">
-                <a16:creationId xmlns:a16="http://schemas.microsoft.com/office/drawing/2014/main" id="{98730BED-0FA2-5BF9-D7FB-EBC38F8CA500}"/>
+          <p:cNvPr id="78" name="Straight Arrow Connector 77">
+            <a:extLst>
+              <a:ext uri="{FF2B5EF4-FFF2-40B4-BE49-F238E27FC236}">
+                <a16:creationId xmlns:a16="http://schemas.microsoft.com/office/drawing/2014/main" id="{F102C9AD-5C6F-5C42-B18C-3A2E734D26A7}"/>
               </a:ext>
             </a:extLst>
           </p:cNvPr>
           <p:cNvCxnSpPr>
-            <a:stCxn id="4" idx="4"/>
+            <a:cxnSpLocks/>
+            <a:endCxn id="77" idx="0"/>
           </p:cNvCxnSpPr>
           <p:nvPr/>
         </p:nvCxnSpPr>
         <p:spPr>
           <a:xfrm>
-            <a:off x="4798451" y="750760"/>
-            <a:ext cx="392" cy="313637"/>
+            <a:off x="3602456" y="5468492"/>
+            <a:ext cx="0" cy="730027"/>
           </a:xfrm>
           <a:prstGeom prst="straightConnector1">
             <a:avLst/>
@@ -3422,12 +3379,56 @@
           </a:fontRef>
         </p:style>
       </p:cxnSp>
-      <p:sp>
-        <p:nvSpPr>
-          <p:cNvPr id="7" name="Rectangle: Rounded Corners 6">
-            <a:extLst>
-              <a:ext uri="{FF2B5EF4-FFF2-40B4-BE49-F238E27FC236}">
-                <a16:creationId xmlns:a16="http://schemas.microsoft.com/office/drawing/2014/main" id="{6C87B8DB-0AB5-D971-D50A-6195FFFBBF04}"/>
+      <p:cxnSp>
+        <p:nvCxnSpPr>
+          <p:cNvPr id="35" name="Straight Arrow Connector 34">
+            <a:extLst>
+              <a:ext uri="{FF2B5EF4-FFF2-40B4-BE49-F238E27FC236}">
+                <a16:creationId xmlns:a16="http://schemas.microsoft.com/office/drawing/2014/main" id="{D5D24FA4-8276-C990-8878-19927F73090D}"/>
+              </a:ext>
+            </a:extLst>
+          </p:cNvPr>
+          <p:cNvCxnSpPr>
+            <a:cxnSpLocks/>
+          </p:cNvCxnSpPr>
+          <p:nvPr/>
+        </p:nvCxnSpPr>
+        <p:spPr>
+          <a:xfrm flipH="1" flipV="1">
+            <a:off x="3604622" y="2253962"/>
+            <a:ext cx="19024" cy="1724560"/>
+          </a:xfrm>
+          <a:prstGeom prst="straightConnector1">
+            <a:avLst/>
+          </a:prstGeom>
+          <a:ln>
+            <a:solidFill>
+              <a:schemeClr val="tx1"/>
+            </a:solidFill>
+            <a:tailEnd type="triangle"/>
+          </a:ln>
+        </p:spPr>
+        <p:style>
+          <a:lnRef idx="1">
+            <a:schemeClr val="accent1"/>
+          </a:lnRef>
+          <a:fillRef idx="0">
+            <a:schemeClr val="accent1"/>
+          </a:fillRef>
+          <a:effectRef idx="0">
+            <a:schemeClr val="accent1"/>
+          </a:effectRef>
+          <a:fontRef idx="minor">
+            <a:schemeClr val="tx1"/>
+          </a:fontRef>
+        </p:style>
+      </p:cxnSp>
+      <p:sp>
+        <p:nvSpPr>
+          <p:cNvPr id="4" name="Oval 3">
+            <a:extLst>
+              <a:ext uri="{FF2B5EF4-FFF2-40B4-BE49-F238E27FC236}">
+                <a16:creationId xmlns:a16="http://schemas.microsoft.com/office/drawing/2014/main" id="{FEC7E5B3-6D99-E28F-A664-9BB39E5F1A42}"/>
               </a:ext>
             </a:extLst>
           </p:cNvPr>
@@ -3436,7 +3437,100 @@
         </p:nvSpPr>
         <p:spPr>
           <a:xfrm>
-            <a:off x="4179340" y="1069424"/>
+            <a:off x="1167043" y="210687"/>
+            <a:ext cx="179109" cy="169683"/>
+          </a:xfrm>
+          <a:prstGeom prst="ellipse">
+            <a:avLst/>
+          </a:prstGeom>
+          <a:solidFill>
+            <a:schemeClr val="tx1"/>
+          </a:solidFill>
+        </p:spPr>
+        <p:style>
+          <a:lnRef idx="2">
+            <a:schemeClr val="accent1">
+              <a:shade val="15000"/>
+            </a:schemeClr>
+          </a:lnRef>
+          <a:fillRef idx="1">
+            <a:schemeClr val="accent1"/>
+          </a:fillRef>
+          <a:effectRef idx="0">
+            <a:schemeClr val="accent1"/>
+          </a:effectRef>
+          <a:fontRef idx="minor">
+            <a:schemeClr val="lt1"/>
+          </a:fontRef>
+        </p:style>
+        <p:txBody>
+          <a:bodyPr rtlCol="0" anchor="ctr"/>
+          <a:lstStyle/>
+          <a:p>
+            <a:pPr algn="ctr"/>
+            <a:endParaRPr lang="en-US"/>
+          </a:p>
+        </p:txBody>
+      </p:sp>
+      <p:cxnSp>
+        <p:nvCxnSpPr>
+          <p:cNvPr id="6" name="Straight Arrow Connector 5">
+            <a:extLst>
+              <a:ext uri="{FF2B5EF4-FFF2-40B4-BE49-F238E27FC236}">
+                <a16:creationId xmlns:a16="http://schemas.microsoft.com/office/drawing/2014/main" id="{98730BED-0FA2-5BF9-D7FB-EBC38F8CA500}"/>
+              </a:ext>
+            </a:extLst>
+          </p:cNvPr>
+          <p:cNvCxnSpPr>
+            <a:stCxn id="4" idx="4"/>
+          </p:cNvCxnSpPr>
+          <p:nvPr/>
+        </p:nvCxnSpPr>
+        <p:spPr>
+          <a:xfrm>
+            <a:off x="1256598" y="380370"/>
+            <a:ext cx="392" cy="313637"/>
+          </a:xfrm>
+          <a:prstGeom prst="straightConnector1">
+            <a:avLst/>
+          </a:prstGeom>
+          <a:ln>
+            <a:solidFill>
+              <a:schemeClr val="tx1"/>
+            </a:solidFill>
+            <a:tailEnd type="triangle"/>
+          </a:ln>
+        </p:spPr>
+        <p:style>
+          <a:lnRef idx="1">
+            <a:schemeClr val="accent1"/>
+          </a:lnRef>
+          <a:fillRef idx="0">
+            <a:schemeClr val="accent1"/>
+          </a:fillRef>
+          <a:effectRef idx="0">
+            <a:schemeClr val="accent1"/>
+          </a:effectRef>
+          <a:fontRef idx="minor">
+            <a:schemeClr val="tx1"/>
+          </a:fontRef>
+        </p:style>
+      </p:cxnSp>
+      <p:sp>
+        <p:nvSpPr>
+          <p:cNvPr id="7" name="Rectangle: Rounded Corners 6">
+            <a:extLst>
+              <a:ext uri="{FF2B5EF4-FFF2-40B4-BE49-F238E27FC236}">
+                <a16:creationId xmlns:a16="http://schemas.microsoft.com/office/drawing/2014/main" id="{6C87B8DB-0AB5-D971-D50A-6195FFFBBF04}"/>
+              </a:ext>
+            </a:extLst>
+          </p:cNvPr>
+          <p:cNvSpPr/>
+          <p:nvPr/>
+        </p:nvSpPr>
+        <p:spPr>
+          <a:xfrm>
+            <a:off x="637487" y="699034"/>
             <a:ext cx="1238221" cy="472440"/>
           </a:xfrm>
           <a:prstGeom prst="roundRect">
@@ -3495,7 +3589,7 @@
         </p:nvSpPr>
         <p:spPr>
           <a:xfrm>
-            <a:off x="4179340" y="1090200"/>
+            <a:off x="637487" y="719810"/>
             <a:ext cx="1204326" cy="430887"/>
           </a:xfrm>
           <a:prstGeom prst="rect">
@@ -3536,7 +3630,7 @@
         </p:nvCxnSpPr>
         <p:spPr>
           <a:xfrm>
-            <a:off x="4798451" y="1541864"/>
+            <a:off x="1256598" y="1171474"/>
             <a:ext cx="392" cy="313637"/>
           </a:xfrm>
           <a:prstGeom prst="straightConnector1">
@@ -3578,7 +3672,7 @@
         </p:nvSpPr>
         <p:spPr>
           <a:xfrm>
-            <a:off x="3923962" y="1856030"/>
+            <a:off x="382109" y="1485640"/>
             <a:ext cx="1715082" cy="623542"/>
           </a:xfrm>
           <a:prstGeom prst="roundRect">
@@ -3637,7 +3731,7 @@
         </p:nvSpPr>
         <p:spPr>
           <a:xfrm>
-            <a:off x="3940909" y="1960052"/>
+            <a:off x="399056" y="1589662"/>
             <a:ext cx="1715082" cy="415498"/>
           </a:xfrm>
           <a:prstGeom prst="rect">
@@ -3684,13 +3778,17 @@
               </a:ext>
             </a:extLst>
           </p:cNvPr>
-          <p:cNvCxnSpPr/>
+          <p:cNvCxnSpPr>
+            <a:cxnSpLocks/>
+            <a:stCxn id="14" idx="3"/>
+            <a:endCxn id="16" idx="1"/>
+          </p:cNvCxnSpPr>
           <p:nvPr/>
         </p:nvCxnSpPr>
         <p:spPr>
-          <a:xfrm>
-            <a:off x="4798451" y="2479572"/>
-            <a:ext cx="392" cy="313637"/>
+          <a:xfrm flipV="1">
+            <a:off x="2114138" y="1787820"/>
+            <a:ext cx="554386" cy="9591"/>
           </a:xfrm>
           <a:prstGeom prst="straightConnector1">
             <a:avLst/>
@@ -3731,7 +3829,7 @@
         </p:nvSpPr>
         <p:spPr>
           <a:xfrm>
-            <a:off x="3836818" y="2793738"/>
+            <a:off x="2668524" y="1323753"/>
             <a:ext cx="1885166" cy="928134"/>
           </a:xfrm>
           <a:prstGeom prst="roundRect">
@@ -3790,7 +3888,7 @@
         </p:nvSpPr>
         <p:spPr>
           <a:xfrm>
-            <a:off x="3940909" y="2821626"/>
+            <a:off x="2772615" y="1351641"/>
             <a:ext cx="1715082" cy="900246"/>
           </a:xfrm>
           <a:prstGeom prst="rect">
@@ -3845,7 +3943,7 @@
         </p:nvCxnSpPr>
         <p:spPr>
           <a:xfrm>
-            <a:off x="5721984" y="3257805"/>
+            <a:off x="4553690" y="1787820"/>
             <a:ext cx="545651" cy="13944"/>
           </a:xfrm>
           <a:prstGeom prst="straightConnector1">
@@ -3887,7 +3985,7 @@
         </p:nvSpPr>
         <p:spPr>
           <a:xfrm rot="2759701">
-            <a:off x="6314658" y="3168629"/>
+            <a:off x="5146364" y="1698644"/>
             <a:ext cx="219694" cy="223997"/>
           </a:xfrm>
           <a:prstGeom prst="rect">
@@ -3950,7 +4048,7 @@
         </p:nvCxnSpPr>
         <p:spPr>
           <a:xfrm>
-            <a:off x="6581377" y="3280627"/>
+            <a:off x="5413083" y="1810642"/>
             <a:ext cx="2393948" cy="0"/>
           </a:xfrm>
           <a:prstGeom prst="straightConnector1">
@@ -3992,7 +4090,7 @@
         </p:nvSpPr>
         <p:spPr>
           <a:xfrm>
-            <a:off x="6521613" y="3024162"/>
+            <a:off x="5353319" y="1554177"/>
             <a:ext cx="2338944" cy="253916"/>
           </a:xfrm>
           <a:prstGeom prst="rect">
@@ -4036,7 +4134,7 @@
         </p:nvSpPr>
         <p:spPr>
           <a:xfrm>
-            <a:off x="8965056" y="3005152"/>
+            <a:off x="7796762" y="1535167"/>
             <a:ext cx="1885166" cy="604969"/>
           </a:xfrm>
           <a:prstGeom prst="roundRect">
@@ -4095,7 +4193,7 @@
         </p:nvSpPr>
         <p:spPr>
           <a:xfrm>
-            <a:off x="9069147" y="3033040"/>
+            <a:off x="7900853" y="1563055"/>
             <a:ext cx="1715082" cy="577081"/>
           </a:xfrm>
           <a:prstGeom prst="rect">
@@ -4149,7 +4247,7 @@
         </p:nvCxnSpPr>
         <p:spPr>
           <a:xfrm>
-            <a:off x="6419743" y="3437446"/>
+            <a:off x="5251449" y="1967461"/>
             <a:ext cx="0" cy="797900"/>
           </a:xfrm>
           <a:prstGeom prst="straightConnector1">
@@ -4191,7 +4289,7 @@
         </p:nvSpPr>
         <p:spPr>
           <a:xfrm>
-            <a:off x="6330287" y="3426595"/>
+            <a:off x="5161993" y="1956610"/>
             <a:ext cx="568173" cy="253916"/>
           </a:xfrm>
           <a:prstGeom prst="rect">
@@ -4228,7 +4326,7 @@
         </p:nvSpPr>
         <p:spPr>
           <a:xfrm rot="2759701">
-            <a:off x="6303205" y="4280166"/>
+            <a:off x="5138745" y="3888020"/>
             <a:ext cx="219694" cy="223997"/>
           </a:xfrm>
           <a:prstGeom prst="rect">
@@ -4275,51 +4373,6 @@
           </a:p>
         </p:txBody>
       </p:sp>
-      <p:cxnSp>
-        <p:nvCxnSpPr>
-          <p:cNvPr id="55" name="Connector: Elbow 54">
-            <a:extLst>
-              <a:ext uri="{FF2B5EF4-FFF2-40B4-BE49-F238E27FC236}">
-                <a16:creationId xmlns:a16="http://schemas.microsoft.com/office/drawing/2014/main" id="{527C3724-D211-064B-3087-90ABFA6A77B8}"/>
-              </a:ext>
-            </a:extLst>
-          </p:cNvPr>
-          <p:cNvCxnSpPr>
-            <a:cxnSpLocks/>
-            <a:stCxn id="45" idx="2"/>
-          </p:cNvCxnSpPr>
-          <p:nvPr/>
-        </p:nvCxnSpPr>
-        <p:spPr>
-          <a:xfrm rot="5400000">
-            <a:off x="7858340" y="2321707"/>
-            <a:ext cx="779934" cy="3356763"/>
-          </a:xfrm>
-          <a:prstGeom prst="bentConnector2">
-            <a:avLst/>
-          </a:prstGeom>
-          <a:ln>
-            <a:solidFill>
-              <a:schemeClr val="tx1"/>
-            </a:solidFill>
-            <a:tailEnd type="triangle"/>
-          </a:ln>
-        </p:spPr>
-        <p:style>
-          <a:lnRef idx="1">
-            <a:schemeClr val="accent1"/>
-          </a:lnRef>
-          <a:fillRef idx="0">
-            <a:schemeClr val="accent1"/>
-          </a:fillRef>
-          <a:effectRef idx="0">
-            <a:schemeClr val="accent1"/>
-          </a:effectRef>
-          <a:fontRef idx="minor">
-            <a:schemeClr val="tx1"/>
-          </a:fontRef>
-        </p:style>
-      </p:cxnSp>
       <p:sp>
         <p:nvSpPr>
           <p:cNvPr id="57" name="Rectangle 56">
@@ -4334,7 +4387,7 @@
         </p:nvSpPr>
         <p:spPr>
           <a:xfrm rot="2759701">
-            <a:off x="5510746" y="4280166"/>
+            <a:off x="3507449" y="3888019"/>
             <a:ext cx="219694" cy="223997"/>
           </a:xfrm>
           <a:prstGeom prst="rect">
@@ -4397,8 +4450,8 @@
         </p:nvCxnSpPr>
         <p:spPr>
           <a:xfrm flipH="1">
-            <a:off x="5779680" y="4390056"/>
-            <a:ext cx="487953" cy="0"/>
+            <a:off x="3777977" y="4005530"/>
+            <a:ext cx="1325196" cy="0"/>
           </a:xfrm>
           <a:prstGeom prst="straightConnector1">
             <a:avLst/>
@@ -4427,53 +4480,6 @@
       </p:cxnSp>
       <p:cxnSp>
         <p:nvCxnSpPr>
-          <p:cNvPr id="67" name="Connector: Elbow 66">
-            <a:extLst>
-              <a:ext uri="{FF2B5EF4-FFF2-40B4-BE49-F238E27FC236}">
-                <a16:creationId xmlns:a16="http://schemas.microsoft.com/office/drawing/2014/main" id="{C6C44CD8-67B8-2F43-5C04-2A7AE84A769A}"/>
-              </a:ext>
-            </a:extLst>
-          </p:cNvPr>
-          <p:cNvCxnSpPr>
-            <a:cxnSpLocks/>
-            <a:endCxn id="16" idx="1"/>
-          </p:cNvCxnSpPr>
-          <p:nvPr/>
-        </p:nvCxnSpPr>
-        <p:spPr>
-          <a:xfrm rot="10800000">
-            <a:off x="3836818" y="3257806"/>
-            <a:ext cx="1622030" cy="1132255"/>
-          </a:xfrm>
-          <a:prstGeom prst="bentConnector3">
-            <a:avLst>
-              <a:gd name="adj1" fmla="val 114093"/>
-            </a:avLst>
-          </a:prstGeom>
-          <a:ln>
-            <a:solidFill>
-              <a:schemeClr val="tx1"/>
-            </a:solidFill>
-            <a:tailEnd type="triangle"/>
-          </a:ln>
-        </p:spPr>
-        <p:style>
-          <a:lnRef idx="1">
-            <a:schemeClr val="accent1"/>
-          </a:lnRef>
-          <a:fillRef idx="0">
-            <a:schemeClr val="accent1"/>
-          </a:fillRef>
-          <a:effectRef idx="0">
-            <a:schemeClr val="accent1"/>
-          </a:effectRef>
-          <a:fontRef idx="minor">
-            <a:schemeClr val="tx1"/>
-          </a:fontRef>
-        </p:style>
-      </p:cxnSp>
-      <p:cxnSp>
-        <p:nvCxnSpPr>
           <p:cNvPr id="71" name="Straight Arrow Connector 70">
             <a:extLst>
               <a:ext uri="{FF2B5EF4-FFF2-40B4-BE49-F238E27FC236}">
@@ -4488,8 +4494,8 @@
         </p:nvCxnSpPr>
         <p:spPr>
           <a:xfrm>
-            <a:off x="5620593" y="4548983"/>
-            <a:ext cx="0" cy="797900"/>
+            <a:off x="5251449" y="3390924"/>
+            <a:ext cx="0" cy="451056"/>
           </a:xfrm>
           <a:prstGeom prst="straightConnector1">
             <a:avLst/>
@@ -4530,7 +4536,7 @@
         </p:nvSpPr>
         <p:spPr>
           <a:xfrm>
-            <a:off x="5533938" y="4790181"/>
+            <a:off x="845364" y="4253246"/>
             <a:ext cx="2818464" cy="253916"/>
           </a:xfrm>
           <a:prstGeom prst="rect">
@@ -4583,7 +4589,7 @@
         </p:nvSpPr>
         <p:spPr>
           <a:xfrm>
-            <a:off x="4965765" y="4158052"/>
+            <a:off x="3119295" y="3444950"/>
             <a:ext cx="568173" cy="253916"/>
           </a:xfrm>
           <a:prstGeom prst="rect">
@@ -4620,7 +4626,7 @@
         </p:nvSpPr>
         <p:spPr>
           <a:xfrm>
-            <a:off x="4684758" y="5350236"/>
+            <a:off x="2662014" y="5288780"/>
             <a:ext cx="1885166" cy="463002"/>
           </a:xfrm>
           <a:prstGeom prst="roundRect">
@@ -4679,7 +4685,7 @@
         </p:nvSpPr>
         <p:spPr>
           <a:xfrm>
-            <a:off x="4788849" y="5378123"/>
+            <a:off x="2766105" y="5316667"/>
             <a:ext cx="1715082" cy="415498"/>
           </a:xfrm>
           <a:prstGeom prst="rect">
@@ -4720,7 +4726,7 @@
         </p:nvSpPr>
         <p:spPr>
           <a:xfrm>
-            <a:off x="5533938" y="6307057"/>
+            <a:off x="3511194" y="6245601"/>
             <a:ext cx="179109" cy="169683"/>
           </a:xfrm>
           <a:prstGeom prst="ellipse">
@@ -4769,7 +4775,7 @@
         </p:nvSpPr>
         <p:spPr>
           <a:xfrm>
-            <a:off x="5485610" y="6259975"/>
+            <a:off x="3462866" y="6198519"/>
             <a:ext cx="279180" cy="270105"/>
           </a:xfrm>
           <a:prstGeom prst="ellipse">
@@ -4802,26 +4808,673 @@
           </a:p>
         </p:txBody>
       </p:sp>
+      <p:sp>
+        <p:nvSpPr>
+          <p:cNvPr id="3" name="Rectangle: Rounded Corners 2">
+            <a:extLst>
+              <a:ext uri="{FF2B5EF4-FFF2-40B4-BE49-F238E27FC236}">
+                <a16:creationId xmlns:a16="http://schemas.microsoft.com/office/drawing/2014/main" id="{1B0C1D1E-7179-0DAA-AD05-CA4B80EFB174}"/>
+              </a:ext>
+            </a:extLst>
+          </p:cNvPr>
+          <p:cNvSpPr/>
+          <p:nvPr/>
+        </p:nvSpPr>
+        <p:spPr>
+          <a:xfrm>
+            <a:off x="4343817" y="2776212"/>
+            <a:ext cx="1885166" cy="604969"/>
+          </a:xfrm>
+          <a:prstGeom prst="roundRect">
+            <a:avLst>
+              <a:gd name="adj" fmla="val 38690"/>
+            </a:avLst>
+          </a:prstGeom>
+          <a:solidFill>
+            <a:schemeClr val="accent4">
+              <a:lumMod val="20000"/>
+              <a:lumOff val="80000"/>
+            </a:schemeClr>
+          </a:solidFill>
+          <a:ln>
+            <a:solidFill>
+              <a:schemeClr val="tx1"/>
+            </a:solidFill>
+          </a:ln>
+        </p:spPr>
+        <p:style>
+          <a:lnRef idx="2">
+            <a:schemeClr val="accent1">
+              <a:shade val="15000"/>
+            </a:schemeClr>
+          </a:lnRef>
+          <a:fillRef idx="1">
+            <a:schemeClr val="accent1"/>
+          </a:fillRef>
+          <a:effectRef idx="0">
+            <a:schemeClr val="accent1"/>
+          </a:effectRef>
+          <a:fontRef idx="minor">
+            <a:schemeClr val="lt1"/>
+          </a:fontRef>
+        </p:style>
+        <p:txBody>
+          <a:bodyPr rtlCol="0" anchor="ctr"/>
+          <a:lstStyle/>
+          <a:p>
+            <a:pPr algn="ctr"/>
+            <a:endParaRPr lang="en-US"/>
+          </a:p>
+        </p:txBody>
+      </p:sp>
+      <p:sp>
+        <p:nvSpPr>
+          <p:cNvPr id="5" name="TextBox 4">
+            <a:extLst>
+              <a:ext uri="{FF2B5EF4-FFF2-40B4-BE49-F238E27FC236}">
+                <a16:creationId xmlns:a16="http://schemas.microsoft.com/office/drawing/2014/main" id="{731F9B6C-7189-0A53-2836-0F1D7D88BABF}"/>
+              </a:ext>
+            </a:extLst>
+          </p:cNvPr>
+          <p:cNvSpPr txBox="1"/>
+          <p:nvPr/>
+        </p:nvSpPr>
+        <p:spPr>
+          <a:xfrm>
+            <a:off x="4447908" y="2804100"/>
+            <a:ext cx="1715082" cy="577081"/>
+          </a:xfrm>
+          <a:prstGeom prst="rect">
+            <a:avLst/>
+          </a:prstGeom>
+          <a:noFill/>
+        </p:spPr>
+        <p:txBody>
+          <a:bodyPr wrap="square" rtlCol="0">
+            <a:spAutoFit/>
+          </a:bodyPr>
+          <a:lstStyle/>
+          <a:p>
+            <a:pPr algn="ctr"/>
+            <a:r>
+              <a:rPr lang="en-US" sz="1050" b="1" dirty="0"/>
+              <a:t>Adds </a:t>
+            </a:r>
+            <a:r>
+              <a:rPr lang="en-US" sz="1050" b="1" dirty="0" err="1"/>
+              <a:t>nextOfKin</a:t>
+            </a:r>
+            <a:r>
+              <a:rPr lang="en-US" sz="1050" b="1" dirty="0"/>
+              <a:t> of Person in </a:t>
+            </a:r>
+            <a:r>
+              <a:rPr lang="en-US" sz="1050" b="1" dirty="0" err="1"/>
+              <a:t>AddressBook</a:t>
+            </a:r>
+            <a:r>
+              <a:rPr lang="en-US" sz="1050" b="1" dirty="0"/>
+              <a:t> to JSON representation</a:t>
+            </a:r>
+          </a:p>
+        </p:txBody>
+      </p:sp>
+      <p:sp>
+        <p:nvSpPr>
+          <p:cNvPr id="24" name="Rectangle 23">
+            <a:extLst>
+              <a:ext uri="{FF2B5EF4-FFF2-40B4-BE49-F238E27FC236}">
+                <a16:creationId xmlns:a16="http://schemas.microsoft.com/office/drawing/2014/main" id="{05550CEB-C72E-84BE-FE6A-F72CB23C23FA}"/>
+              </a:ext>
+            </a:extLst>
+          </p:cNvPr>
+          <p:cNvSpPr/>
+          <p:nvPr/>
+        </p:nvSpPr>
+        <p:spPr>
+          <a:xfrm rot="2759701">
+            <a:off x="8648546" y="2700372"/>
+            <a:ext cx="219694" cy="223997"/>
+          </a:xfrm>
+          <a:prstGeom prst="rect">
+            <a:avLst/>
+          </a:prstGeom>
+          <a:solidFill>
+            <a:schemeClr val="accent4">
+              <a:lumMod val="20000"/>
+              <a:lumOff val="80000"/>
+            </a:schemeClr>
+          </a:solidFill>
+          <a:ln>
+            <a:solidFill>
+              <a:schemeClr val="tx1"/>
+            </a:solidFill>
+          </a:ln>
+        </p:spPr>
+        <p:style>
+          <a:lnRef idx="2">
+            <a:schemeClr val="accent1">
+              <a:shade val="15000"/>
+            </a:schemeClr>
+          </a:lnRef>
+          <a:fillRef idx="1">
+            <a:schemeClr val="accent1"/>
+          </a:fillRef>
+          <a:effectRef idx="0">
+            <a:schemeClr val="accent1"/>
+          </a:effectRef>
+          <a:fontRef idx="minor">
+            <a:schemeClr val="lt1"/>
+          </a:fontRef>
+        </p:style>
+        <p:txBody>
+          <a:bodyPr rtlCol="0" anchor="ctr"/>
+          <a:lstStyle/>
+          <a:p>
+            <a:pPr algn="ctr"/>
+            <a:endParaRPr lang="en-US">
+              <a:solidFill>
+                <a:sysClr val="windowText" lastClr="000000"/>
+              </a:solidFill>
+            </a:endParaRPr>
+          </a:p>
+        </p:txBody>
+      </p:sp>
       <p:cxnSp>
         <p:nvCxnSpPr>
-          <p:cNvPr id="78" name="Straight Arrow Connector 77">
-            <a:extLst>
-              <a:ext uri="{FF2B5EF4-FFF2-40B4-BE49-F238E27FC236}">
-                <a16:creationId xmlns:a16="http://schemas.microsoft.com/office/drawing/2014/main" id="{F102C9AD-5C6F-5C42-B18C-3A2E734D26A7}"/>
+          <p:cNvPr id="29" name="Straight Arrow Connector 28">
+            <a:extLst>
+              <a:ext uri="{FF2B5EF4-FFF2-40B4-BE49-F238E27FC236}">
+                <a16:creationId xmlns:a16="http://schemas.microsoft.com/office/drawing/2014/main" id="{05E5F469-E8E6-4928-E533-30C674431991}"/>
               </a:ext>
             </a:extLst>
           </p:cNvPr>
           <p:cNvCxnSpPr>
             <a:cxnSpLocks/>
-            <a:stCxn id="74" idx="2"/>
-            <a:endCxn id="77" idx="0"/>
+            <a:stCxn id="45" idx="2"/>
           </p:cNvCxnSpPr>
           <p:nvPr/>
         </p:nvCxnSpPr>
         <p:spPr>
+          <a:xfrm>
+            <a:off x="8758394" y="2140136"/>
+            <a:ext cx="0" cy="519244"/>
+          </a:xfrm>
+          <a:prstGeom prst="straightConnector1">
+            <a:avLst/>
+          </a:prstGeom>
+          <a:ln>
+            <a:solidFill>
+              <a:schemeClr val="tx1"/>
+            </a:solidFill>
+            <a:tailEnd type="triangle"/>
+          </a:ln>
+        </p:spPr>
+        <p:style>
+          <a:lnRef idx="1">
+            <a:schemeClr val="accent1"/>
+          </a:lnRef>
+          <a:fillRef idx="0">
+            <a:schemeClr val="accent1"/>
+          </a:fillRef>
+          <a:effectRef idx="0">
+            <a:schemeClr val="accent1"/>
+          </a:effectRef>
+          <a:fontRef idx="minor">
+            <a:schemeClr val="tx1"/>
+          </a:fontRef>
+        </p:style>
+      </p:cxnSp>
+      <p:sp>
+        <p:nvSpPr>
+          <p:cNvPr id="33" name="Rectangle: Rounded Corners 32">
+            <a:extLst>
+              <a:ext uri="{FF2B5EF4-FFF2-40B4-BE49-F238E27FC236}">
+                <a16:creationId xmlns:a16="http://schemas.microsoft.com/office/drawing/2014/main" id="{8B1F4DA3-1EEE-A3F7-773B-2E8009624170}"/>
+              </a:ext>
+            </a:extLst>
+          </p:cNvPr>
+          <p:cNvSpPr/>
+          <p:nvPr/>
+        </p:nvSpPr>
+        <p:spPr>
+          <a:xfrm>
+            <a:off x="7811240" y="3698866"/>
+            <a:ext cx="1885166" cy="604969"/>
+          </a:xfrm>
+          <a:prstGeom prst="roundRect">
+            <a:avLst>
+              <a:gd name="adj" fmla="val 38690"/>
+            </a:avLst>
+          </a:prstGeom>
+          <a:solidFill>
+            <a:schemeClr val="accent4">
+              <a:lumMod val="20000"/>
+              <a:lumOff val="80000"/>
+            </a:schemeClr>
+          </a:solidFill>
+          <a:ln>
+            <a:solidFill>
+              <a:schemeClr val="tx1"/>
+            </a:solidFill>
+          </a:ln>
+        </p:spPr>
+        <p:style>
+          <a:lnRef idx="2">
+            <a:schemeClr val="accent1">
+              <a:shade val="15000"/>
+            </a:schemeClr>
+          </a:lnRef>
+          <a:fillRef idx="1">
+            <a:schemeClr val="accent1"/>
+          </a:fillRef>
+          <a:effectRef idx="0">
+            <a:schemeClr val="accent1"/>
+          </a:effectRef>
+          <a:fontRef idx="minor">
+            <a:schemeClr val="lt1"/>
+          </a:fontRef>
+        </p:style>
+        <p:txBody>
+          <a:bodyPr rtlCol="0" anchor="ctr"/>
+          <a:lstStyle/>
+          <a:p>
+            <a:pPr algn="ctr"/>
+            <a:endParaRPr lang="en-US"/>
+          </a:p>
+        </p:txBody>
+      </p:sp>
+      <p:sp>
+        <p:nvSpPr>
+          <p:cNvPr id="34" name="TextBox 33">
+            <a:extLst>
+              <a:ext uri="{FF2B5EF4-FFF2-40B4-BE49-F238E27FC236}">
+                <a16:creationId xmlns:a16="http://schemas.microsoft.com/office/drawing/2014/main" id="{90D750E6-3982-99F9-9EDA-5F3F4DF29C60}"/>
+              </a:ext>
+            </a:extLst>
+          </p:cNvPr>
+          <p:cNvSpPr txBox="1"/>
+          <p:nvPr/>
+        </p:nvSpPr>
+        <p:spPr>
+          <a:xfrm>
+            <a:off x="7915331" y="3726754"/>
+            <a:ext cx="1715082" cy="577081"/>
+          </a:xfrm>
+          <a:prstGeom prst="rect">
+            <a:avLst/>
+          </a:prstGeom>
+          <a:noFill/>
+        </p:spPr>
+        <p:txBody>
+          <a:bodyPr wrap="square" rtlCol="0">
+            <a:spAutoFit/>
+          </a:bodyPr>
+          <a:lstStyle/>
+          <a:p>
+            <a:pPr algn="ctr"/>
+            <a:r>
+              <a:rPr lang="en-US" sz="1050" b="1" dirty="0"/>
+              <a:t>Adds </a:t>
+            </a:r>
+            <a:r>
+              <a:rPr lang="en-US" sz="1050" b="1" dirty="0" err="1"/>
+              <a:t>specialisations</a:t>
+            </a:r>
+            <a:r>
+              <a:rPr lang="en-US" sz="1050" b="1" dirty="0"/>
+              <a:t> of Person in </a:t>
+            </a:r>
+            <a:r>
+              <a:rPr lang="en-US" sz="1050" b="1" dirty="0" err="1"/>
+              <a:t>AddressBook</a:t>
+            </a:r>
+            <a:r>
+              <a:rPr lang="en-US" sz="1050" b="1" dirty="0"/>
+              <a:t> to JSON representation</a:t>
+            </a:r>
+          </a:p>
+        </p:txBody>
+      </p:sp>
+      <p:cxnSp>
+        <p:nvCxnSpPr>
+          <p:cNvPr id="37" name="Straight Arrow Connector 36">
+            <a:extLst>
+              <a:ext uri="{FF2B5EF4-FFF2-40B4-BE49-F238E27FC236}">
+                <a16:creationId xmlns:a16="http://schemas.microsoft.com/office/drawing/2014/main" id="{B3C6C8C6-D67B-83FA-E8E7-27A3E98975A9}"/>
+              </a:ext>
+            </a:extLst>
+          </p:cNvPr>
+          <p:cNvCxnSpPr>
+            <a:cxnSpLocks/>
+            <a:endCxn id="33" idx="0"/>
+          </p:cNvCxnSpPr>
+          <p:nvPr/>
+        </p:nvCxnSpPr>
+        <p:spPr>
+          <a:xfrm>
+            <a:off x="8753823" y="2969189"/>
+            <a:ext cx="0" cy="729677"/>
+          </a:xfrm>
+          <a:prstGeom prst="straightConnector1">
+            <a:avLst/>
+          </a:prstGeom>
+          <a:ln>
+            <a:solidFill>
+              <a:schemeClr val="tx1"/>
+            </a:solidFill>
+            <a:tailEnd type="triangle"/>
+          </a:ln>
+        </p:spPr>
+        <p:style>
+          <a:lnRef idx="1">
+            <a:schemeClr val="accent1"/>
+          </a:lnRef>
+          <a:fillRef idx="0">
+            <a:schemeClr val="accent1"/>
+          </a:fillRef>
+          <a:effectRef idx="0">
+            <a:schemeClr val="accent1"/>
+          </a:effectRef>
+          <a:fontRef idx="minor">
+            <a:schemeClr val="tx1"/>
+          </a:fontRef>
+        </p:style>
+      </p:cxnSp>
+      <p:sp>
+        <p:nvSpPr>
+          <p:cNvPr id="49" name="TextBox 48">
+            <a:extLst>
+              <a:ext uri="{FF2B5EF4-FFF2-40B4-BE49-F238E27FC236}">
+                <a16:creationId xmlns:a16="http://schemas.microsoft.com/office/drawing/2014/main" id="{C309A0CB-B2A4-0F7F-2137-F7A304721825}"/>
+              </a:ext>
+            </a:extLst>
+          </p:cNvPr>
+          <p:cNvSpPr txBox="1"/>
+          <p:nvPr/>
+        </p:nvSpPr>
+        <p:spPr>
+          <a:xfrm>
+            <a:off x="8388825" y="3109503"/>
+            <a:ext cx="2338944" cy="253916"/>
+          </a:xfrm>
+          <a:prstGeom prst="rect">
+            <a:avLst/>
+          </a:prstGeom>
+          <a:noFill/>
+        </p:spPr>
+        <p:txBody>
+          <a:bodyPr wrap="square" rtlCol="0">
+            <a:spAutoFit/>
+          </a:bodyPr>
+          <a:lstStyle/>
+          <a:p>
+            <a:pPr algn="ctr"/>
+            <a:r>
+              <a:rPr lang="en-SG" sz="1050" b="1" dirty="0"/>
+              <a:t>[P</a:t>
+            </a:r>
+            <a:r>
+              <a:rPr lang="en-US" sz="1050" b="1" dirty="0" err="1"/>
+              <a:t>erson</a:t>
+            </a:r>
+            <a:r>
+              <a:rPr lang="en-US" sz="1050" b="1" dirty="0"/>
+              <a:t> has role “Doctor”]</a:t>
+            </a:r>
+          </a:p>
+        </p:txBody>
+      </p:sp>
+      <p:sp>
+        <p:nvSpPr>
+          <p:cNvPr id="56" name="Rectangle 55">
+            <a:extLst>
+              <a:ext uri="{FF2B5EF4-FFF2-40B4-BE49-F238E27FC236}">
+                <a16:creationId xmlns:a16="http://schemas.microsoft.com/office/drawing/2014/main" id="{BD2BD26D-BA95-ABC4-E87E-33B91E454F43}"/>
+              </a:ext>
+            </a:extLst>
+          </p:cNvPr>
+          <p:cNvSpPr/>
+          <p:nvPr/>
+        </p:nvSpPr>
+        <p:spPr>
+          <a:xfrm rot="2759701">
+            <a:off x="7112132" y="3889351"/>
+            <a:ext cx="219694" cy="223997"/>
+          </a:xfrm>
+          <a:prstGeom prst="rect">
+            <a:avLst/>
+          </a:prstGeom>
+          <a:solidFill>
+            <a:schemeClr val="accent4">
+              <a:lumMod val="20000"/>
+              <a:lumOff val="80000"/>
+            </a:schemeClr>
+          </a:solidFill>
+          <a:ln>
+            <a:solidFill>
+              <a:schemeClr val="tx1"/>
+            </a:solidFill>
+          </a:ln>
+        </p:spPr>
+        <p:style>
+          <a:lnRef idx="2">
+            <a:schemeClr val="accent1">
+              <a:shade val="15000"/>
+            </a:schemeClr>
+          </a:lnRef>
+          <a:fillRef idx="1">
+            <a:schemeClr val="accent1"/>
+          </a:fillRef>
+          <a:effectRef idx="0">
+            <a:schemeClr val="accent1"/>
+          </a:effectRef>
+          <a:fontRef idx="minor">
+            <a:schemeClr val="lt1"/>
+          </a:fontRef>
+        </p:style>
+        <p:txBody>
+          <a:bodyPr rtlCol="0" anchor="ctr"/>
+          <a:lstStyle/>
+          <a:p>
+            <a:pPr algn="ctr"/>
+            <a:endParaRPr lang="en-US">
+              <a:solidFill>
+                <a:sysClr val="windowText" lastClr="000000"/>
+              </a:solidFill>
+            </a:endParaRPr>
+          </a:p>
+        </p:txBody>
+      </p:sp>
+      <p:cxnSp>
+        <p:nvCxnSpPr>
+          <p:cNvPr id="58" name="Connector: Elbow 57">
+            <a:extLst>
+              <a:ext uri="{FF2B5EF4-FFF2-40B4-BE49-F238E27FC236}">
+                <a16:creationId xmlns:a16="http://schemas.microsoft.com/office/drawing/2014/main" id="{C186F13A-1DAD-C1DE-39E2-44A9294E4257}"/>
+              </a:ext>
+            </a:extLst>
+          </p:cNvPr>
+          <p:cNvCxnSpPr>
+            <a:cxnSpLocks/>
+          </p:cNvCxnSpPr>
+          <p:nvPr/>
+        </p:nvCxnSpPr>
+        <p:spPr>
+          <a:xfrm rot="10800000" flipV="1">
+            <a:off x="7221980" y="2812367"/>
+            <a:ext cx="1370405" cy="1029613"/>
+          </a:xfrm>
+          <a:prstGeom prst="bentConnector3">
+            <a:avLst>
+              <a:gd name="adj1" fmla="val 100044"/>
+            </a:avLst>
+          </a:prstGeom>
+          <a:ln>
+            <a:solidFill>
+              <a:schemeClr val="tx1"/>
+            </a:solidFill>
+            <a:tailEnd type="triangle"/>
+          </a:ln>
+        </p:spPr>
+        <p:style>
+          <a:lnRef idx="1">
+            <a:schemeClr val="accent1"/>
+          </a:lnRef>
+          <a:fillRef idx="0">
+            <a:schemeClr val="accent1"/>
+          </a:fillRef>
+          <a:effectRef idx="0">
+            <a:schemeClr val="accent1"/>
+          </a:effectRef>
+          <a:fontRef idx="minor">
+            <a:schemeClr val="tx1"/>
+          </a:fontRef>
+        </p:style>
+      </p:cxnSp>
+      <p:cxnSp>
+        <p:nvCxnSpPr>
+          <p:cNvPr id="84" name="Straight Arrow Connector 83">
+            <a:extLst>
+              <a:ext uri="{FF2B5EF4-FFF2-40B4-BE49-F238E27FC236}">
+                <a16:creationId xmlns:a16="http://schemas.microsoft.com/office/drawing/2014/main" id="{69FF20C3-8340-3403-D75A-4A659ECC76A3}"/>
+              </a:ext>
+            </a:extLst>
+          </p:cNvPr>
+          <p:cNvCxnSpPr>
+            <a:cxnSpLocks/>
+          </p:cNvCxnSpPr>
+          <p:nvPr/>
+        </p:nvCxnSpPr>
+        <p:spPr>
+          <a:xfrm flipH="1" flipV="1">
+            <a:off x="7384563" y="4001349"/>
+            <a:ext cx="422867" cy="2"/>
+          </a:xfrm>
+          <a:prstGeom prst="straightConnector1">
+            <a:avLst/>
+          </a:prstGeom>
+          <a:ln>
+            <a:solidFill>
+              <a:schemeClr val="tx1"/>
+            </a:solidFill>
+            <a:tailEnd type="triangle"/>
+          </a:ln>
+        </p:spPr>
+        <p:style>
+          <a:lnRef idx="1">
+            <a:schemeClr val="accent1"/>
+          </a:lnRef>
+          <a:fillRef idx="0">
+            <a:schemeClr val="accent1"/>
+          </a:fillRef>
+          <a:effectRef idx="0">
+            <a:schemeClr val="accent1"/>
+          </a:effectRef>
+          <a:fontRef idx="minor">
+            <a:schemeClr val="tx1"/>
+          </a:fontRef>
+        </p:style>
+      </p:cxnSp>
+      <p:sp>
+        <p:nvSpPr>
+          <p:cNvPr id="88" name="TextBox 87">
+            <a:extLst>
+              <a:ext uri="{FF2B5EF4-FFF2-40B4-BE49-F238E27FC236}">
+                <a16:creationId xmlns:a16="http://schemas.microsoft.com/office/drawing/2014/main" id="{4572D7D5-B3F2-2B6E-2F93-3976B2DD418F}"/>
+              </a:ext>
+            </a:extLst>
+          </p:cNvPr>
+          <p:cNvSpPr txBox="1"/>
+          <p:nvPr/>
+        </p:nvSpPr>
+        <p:spPr>
+          <a:xfrm>
+            <a:off x="7984571" y="2589465"/>
+            <a:ext cx="568173" cy="253916"/>
+          </a:xfrm>
+          <a:prstGeom prst="rect">
+            <a:avLst/>
+          </a:prstGeom>
+          <a:noFill/>
+        </p:spPr>
+        <p:txBody>
+          <a:bodyPr wrap="square" rtlCol="0">
+            <a:spAutoFit/>
+          </a:bodyPr>
+          <a:lstStyle/>
+          <a:p>
+            <a:pPr algn="ctr"/>
+            <a:r>
+              <a:rPr lang="en-SG" sz="1050" b="1" dirty="0"/>
+              <a:t>[else]</a:t>
+            </a:r>
+            <a:endParaRPr lang="en-US" sz="1050" b="1" dirty="0"/>
+          </a:p>
+        </p:txBody>
+      </p:sp>
+      <p:cxnSp>
+        <p:nvCxnSpPr>
+          <p:cNvPr id="91" name="Straight Arrow Connector 90">
+            <a:extLst>
+              <a:ext uri="{FF2B5EF4-FFF2-40B4-BE49-F238E27FC236}">
+                <a16:creationId xmlns:a16="http://schemas.microsoft.com/office/drawing/2014/main" id="{6C1C7779-D0B8-B891-9290-3508F9F37DCB}"/>
+              </a:ext>
+            </a:extLst>
+          </p:cNvPr>
+          <p:cNvCxnSpPr>
+            <a:cxnSpLocks/>
+          </p:cNvCxnSpPr>
+          <p:nvPr/>
+        </p:nvCxnSpPr>
+        <p:spPr>
           <a:xfrm flipH="1">
-            <a:off x="5625200" y="5813238"/>
-            <a:ext cx="2141" cy="446737"/>
+            <a:off x="5409273" y="4001349"/>
+            <a:ext cx="1652024" cy="0"/>
+          </a:xfrm>
+          <a:prstGeom prst="straightConnector1">
+            <a:avLst/>
+          </a:prstGeom>
+          <a:ln>
+            <a:solidFill>
+              <a:schemeClr val="tx1"/>
+            </a:solidFill>
+            <a:tailEnd type="triangle"/>
+          </a:ln>
+        </p:spPr>
+        <p:style>
+          <a:lnRef idx="1">
+            <a:schemeClr val="accent1"/>
+          </a:lnRef>
+          <a:fillRef idx="0">
+            <a:schemeClr val="accent1"/>
+          </a:fillRef>
+          <a:effectRef idx="0">
+            <a:schemeClr val="accent1"/>
+          </a:effectRef>
+          <a:fontRef idx="minor">
+            <a:schemeClr val="tx1"/>
+          </a:fontRef>
+        </p:style>
+      </p:cxnSp>
+      <p:cxnSp>
+        <p:nvCxnSpPr>
+          <p:cNvPr id="108" name="Straight Arrow Connector 107">
+            <a:extLst>
+              <a:ext uri="{FF2B5EF4-FFF2-40B4-BE49-F238E27FC236}">
+                <a16:creationId xmlns:a16="http://schemas.microsoft.com/office/drawing/2014/main" id="{748EEE6A-956A-F071-60AC-54CFFE2CFE4C}"/>
+              </a:ext>
+            </a:extLst>
+          </p:cNvPr>
+          <p:cNvCxnSpPr>
+            <a:cxnSpLocks/>
+          </p:cNvCxnSpPr>
+          <p:nvPr/>
+        </p:nvCxnSpPr>
+        <p:spPr>
+          <a:xfrm>
+            <a:off x="3609702" y="4156836"/>
+            <a:ext cx="1405" cy="1133342"/>
           </a:xfrm>
           <a:prstGeom prst="straightConnector1">
             <a:avLst/>
@@ -5309,18 +5962,18 @@
 </file>
 
 <file path=customXml/item2.xml><?xml version="1.0" encoding="utf-8"?>
+<p:properties xmlns:p="http://schemas.microsoft.com/office/2006/metadata/properties" xmlns:xsi="http://www.w3.org/2001/XMLSchema-instance" xmlns:pc="http://schemas.microsoft.com/office/infopath/2007/PartnerControls">
+  <documentManagement/>
+</p:properties>
+</file>
+
+<file path=customXml/item3.xml><?xml version="1.0" encoding="utf-8"?>
 <?mso-contentType ?>
 <FormTemplates xmlns="http://schemas.microsoft.com/sharepoint/v3/contenttype/forms">
   <Display>DocumentLibraryForm</Display>
   <Edit>DocumentLibraryForm</Edit>
   <New>DocumentLibraryForm</New>
 </FormTemplates>
-</file>
-
-<file path=customXml/item3.xml><?xml version="1.0" encoding="utf-8"?>
-<p:properties xmlns:p="http://schemas.microsoft.com/office/2006/metadata/properties" xmlns:xsi="http://www.w3.org/2001/XMLSchema-instance" xmlns:pc="http://schemas.microsoft.com/office/infopath/2007/PartnerControls">
-  <documentManagement/>
-</p:properties>
 </file>
 
 <file path=customXml/itemProps1.xml><?xml version="1.0" encoding="utf-8"?>
@@ -5342,14 +5995,6 @@
 </file>
 
 <file path=customXml/itemProps2.xml><?xml version="1.0" encoding="utf-8"?>
-<ds:datastoreItem xmlns:ds="http://schemas.openxmlformats.org/officeDocument/2006/customXml" ds:itemID="{756B5A2C-C09D-4CDD-B723-5FA1059E9133}">
-  <ds:schemaRefs>
-    <ds:schemaRef ds:uri="http://schemas.microsoft.com/sharepoint/v3/contenttype/forms"/>
-  </ds:schemaRefs>
-</ds:datastoreItem>
-</file>
-
-<file path=customXml/itemProps3.xml><?xml version="1.0" encoding="utf-8"?>
 <ds:datastoreItem xmlns:ds="http://schemas.openxmlformats.org/officeDocument/2006/customXml" ds:itemID="{CECB0907-EDB3-46BC-9DAC-D78CE11B19B5}">
   <ds:schemaRefs>
     <ds:schemaRef ds:uri="http://schemas.microsoft.com/office/2006/documentManagement/types"/>
@@ -5363,4 +6008,12 @@
     <ds:schemaRef ds:uri="http://schemas.microsoft.com/office/2006/metadata/properties"/>
   </ds:schemaRefs>
 </ds:datastoreItem>
+</file>
+
+<file path=customXml/itemProps3.xml><?xml version="1.0" encoding="utf-8"?>
+<ds:datastoreItem xmlns:ds="http://schemas.openxmlformats.org/officeDocument/2006/customXml" ds:itemID="{756B5A2C-C09D-4CDD-B723-5FA1059E9133}">
+  <ds:schemaRefs>
+    <ds:schemaRef ds:uri="http://schemas.microsoft.com/sharepoint/v3/contenttype/forms"/>
+  </ds:schemaRefs>
+</ds:datastoreItem>
 </file>
</xml_diff>